<commit_message>
Add links to registration and feedback forms
</commit_message>
<xml_diff>
--- a/Documentation/Tutorials/NeuroDOT_Tutorial_Getting_Started.pptx
+++ b/Documentation/Tutorials/NeuroDOT_Tutorial_Getting_Started.pptx
@@ -19,7 +19,8 @@
     <p:sldId id="285" r:id="rId13"/>
     <p:sldId id="296" r:id="rId14"/>
     <p:sldId id="279" r:id="rId15"/>
-    <p:sldId id="282" r:id="rId16"/>
+    <p:sldId id="694" r:id="rId16"/>
+    <p:sldId id="282" r:id="rId17"/>
   </p:sldIdLst>
   <p:sldSz cx="12192000" cy="6858000"/>
   <p:notesSz cx="6858000" cy="9144000"/>
@@ -257,7 +258,7 @@
           <a:p>
             <a:fld id="{162AC784-C7BB-45CE-AB0D-139C9E5F95B5}" type="datetimeFigureOut">
               <a:rPr lang="en-US" smtClean="0"/>
-              <a:t>3/6/2024</a:t>
+              <a:t>6/3/2024</a:t>
             </a:fld>
             <a:endParaRPr lang="en-US"/>
           </a:p>
@@ -427,7 +428,7 @@
           <a:p>
             <a:fld id="{162AC784-C7BB-45CE-AB0D-139C9E5F95B5}" type="datetimeFigureOut">
               <a:rPr lang="en-US" smtClean="0"/>
-              <a:t>3/6/2024</a:t>
+              <a:t>6/3/2024</a:t>
             </a:fld>
             <a:endParaRPr lang="en-US"/>
           </a:p>
@@ -607,7 +608,7 @@
           <a:p>
             <a:fld id="{162AC784-C7BB-45CE-AB0D-139C9E5F95B5}" type="datetimeFigureOut">
               <a:rPr lang="en-US" smtClean="0"/>
-              <a:t>3/6/2024</a:t>
+              <a:t>6/3/2024</a:t>
             </a:fld>
             <a:endParaRPr lang="en-US"/>
           </a:p>
@@ -777,7 +778,7 @@
           <a:p>
             <a:fld id="{162AC784-C7BB-45CE-AB0D-139C9E5F95B5}" type="datetimeFigureOut">
               <a:rPr lang="en-US" smtClean="0"/>
-              <a:t>3/6/2024</a:t>
+              <a:t>6/3/2024</a:t>
             </a:fld>
             <a:endParaRPr lang="en-US"/>
           </a:p>
@@ -1023,7 +1024,7 @@
           <a:p>
             <a:fld id="{162AC784-C7BB-45CE-AB0D-139C9E5F95B5}" type="datetimeFigureOut">
               <a:rPr lang="en-US" smtClean="0"/>
-              <a:t>3/6/2024</a:t>
+              <a:t>6/3/2024</a:t>
             </a:fld>
             <a:endParaRPr lang="en-US"/>
           </a:p>
@@ -1255,7 +1256,7 @@
           <a:p>
             <a:fld id="{162AC784-C7BB-45CE-AB0D-139C9E5F95B5}" type="datetimeFigureOut">
               <a:rPr lang="en-US" smtClean="0"/>
-              <a:t>3/6/2024</a:t>
+              <a:t>6/3/2024</a:t>
             </a:fld>
             <a:endParaRPr lang="en-US"/>
           </a:p>
@@ -1622,7 +1623,7 @@
           <a:p>
             <a:fld id="{162AC784-C7BB-45CE-AB0D-139C9E5F95B5}" type="datetimeFigureOut">
               <a:rPr lang="en-US" smtClean="0"/>
-              <a:t>3/6/2024</a:t>
+              <a:t>6/3/2024</a:t>
             </a:fld>
             <a:endParaRPr lang="en-US"/>
           </a:p>
@@ -1740,7 +1741,7 @@
           <a:p>
             <a:fld id="{162AC784-C7BB-45CE-AB0D-139C9E5F95B5}" type="datetimeFigureOut">
               <a:rPr lang="en-US" smtClean="0"/>
-              <a:t>3/6/2024</a:t>
+              <a:t>6/3/2024</a:t>
             </a:fld>
             <a:endParaRPr lang="en-US"/>
           </a:p>
@@ -1835,7 +1836,7 @@
           <a:p>
             <a:fld id="{162AC784-C7BB-45CE-AB0D-139C9E5F95B5}" type="datetimeFigureOut">
               <a:rPr lang="en-US" smtClean="0"/>
-              <a:t>3/6/2024</a:t>
+              <a:t>6/3/2024</a:t>
             </a:fld>
             <a:endParaRPr lang="en-US"/>
           </a:p>
@@ -2112,7 +2113,7 @@
           <a:p>
             <a:fld id="{162AC784-C7BB-45CE-AB0D-139C9E5F95B5}" type="datetimeFigureOut">
               <a:rPr lang="en-US" smtClean="0"/>
-              <a:t>3/6/2024</a:t>
+              <a:t>6/3/2024</a:t>
             </a:fld>
             <a:endParaRPr lang="en-US"/>
           </a:p>
@@ -2369,7 +2370,7 @@
           <a:p>
             <a:fld id="{162AC784-C7BB-45CE-AB0D-139C9E5F95B5}" type="datetimeFigureOut">
               <a:rPr lang="en-US" smtClean="0"/>
-              <a:t>3/6/2024</a:t>
+              <a:t>6/3/2024</a:t>
             </a:fld>
             <a:endParaRPr lang="en-US"/>
           </a:p>
@@ -2582,7 +2583,7 @@
           <a:p>
             <a:fld id="{162AC784-C7BB-45CE-AB0D-139C9E5F95B5}" type="datetimeFigureOut">
               <a:rPr lang="en-US" smtClean="0"/>
-              <a:t>3/6/2024</a:t>
+              <a:t>6/3/2024</a:t>
             </a:fld>
             <a:endParaRPr lang="en-US"/>
           </a:p>
@@ -4446,6 +4447,195 @@
           <p:cNvPr id="2" name="Title 1">
             <a:extLst>
               <a:ext uri="{FF2B5EF4-FFF2-40B4-BE49-F238E27FC236}">
+                <a16:creationId xmlns:a16="http://schemas.microsoft.com/office/drawing/2014/main" id="{A803BCE7-414D-3EAA-9C61-81A68BF81CB3}"/>
+              </a:ext>
+            </a:extLst>
+          </p:cNvPr>
+          <p:cNvSpPr>
+            <a:spLocks noGrp="1"/>
+          </p:cNvSpPr>
+          <p:nvPr>
+            <p:ph type="title"/>
+          </p:nvPr>
+        </p:nvSpPr>
+        <p:spPr/>
+        <p:txBody>
+          <a:bodyPr/>
+          <a:lstStyle/>
+          <a:p>
+            <a:r>
+              <a:rPr lang="en-US" dirty="0">
+                <a:solidFill>
+                  <a:srgbClr val="FF0000"/>
+                </a:solidFill>
+              </a:rPr>
+              <a:t>Help Expand NeuroDOT’s Utility!</a:t>
+            </a:r>
+          </a:p>
+        </p:txBody>
+      </p:sp>
+      <p:sp>
+        <p:nvSpPr>
+          <p:cNvPr id="3" name="Content Placeholder 2">
+            <a:extLst>
+              <a:ext uri="{FF2B5EF4-FFF2-40B4-BE49-F238E27FC236}">
+                <a16:creationId xmlns:a16="http://schemas.microsoft.com/office/drawing/2014/main" id="{B4AE1AFD-E0BF-B7CE-30F1-4AED6553B085}"/>
+              </a:ext>
+            </a:extLst>
+          </p:cNvPr>
+          <p:cNvSpPr>
+            <a:spLocks noGrp="1"/>
+          </p:cNvSpPr>
+          <p:nvPr>
+            <p:ph idx="1"/>
+          </p:nvPr>
+        </p:nvSpPr>
+        <p:spPr>
+          <a:xfrm>
+            <a:off x="677334" y="2170316"/>
+            <a:ext cx="10062002" cy="3880773"/>
+          </a:xfrm>
+        </p:spPr>
+        <p:txBody>
+          <a:bodyPr>
+            <a:normAutofit fontScale="77500" lnSpcReduction="20000"/>
+          </a:bodyPr>
+          <a:lstStyle/>
+          <a:p>
+            <a:r>
+              <a:rPr lang="en-US" dirty="0"/>
+              <a:t>Please fill out the NeuroDOT registration form to help us better develop the NeuroDOT toolbox and expand its utility to address your fNIRS/DOT data analysis needs:</a:t>
+            </a:r>
+          </a:p>
+          <a:p>
+            <a:pPr lvl="1"/>
+            <a:r>
+              <a:rPr lang="en-US" dirty="0">
+                <a:hlinkClick r:id="rId2"/>
+              </a:rPr>
+              <a:t>https://forms.gle/8QNGnx7ZbKuUHg3bA</a:t>
+            </a:r>
+            <a:r>
+              <a:rPr lang="en-US" dirty="0"/>
+              <a:t> </a:t>
+            </a:r>
+          </a:p>
+          <a:p>
+            <a:pPr marL="457200" lvl="1" indent="0">
+              <a:buNone/>
+            </a:pPr>
+            <a:endParaRPr lang="en-US" dirty="0"/>
+          </a:p>
+          <a:p>
+            <a:pPr marL="457200" lvl="1" indent="0">
+              <a:buNone/>
+            </a:pPr>
+            <a:endParaRPr lang="en-US" dirty="0"/>
+          </a:p>
+          <a:p>
+            <a:pPr marL="457200" lvl="1" indent="0">
+              <a:buNone/>
+            </a:pPr>
+            <a:endParaRPr lang="en-US" dirty="0"/>
+          </a:p>
+          <a:p>
+            <a:r>
+              <a:rPr lang="en-US" dirty="0"/>
+              <a:t>Additionally, please provide specific feedback, or ask questions to the development team:</a:t>
+            </a:r>
+          </a:p>
+          <a:p>
+            <a:pPr lvl="1"/>
+            <a:r>
+              <a:rPr lang="en-US" dirty="0">
+                <a:hlinkClick r:id="rId3"/>
+              </a:rPr>
+              <a:t>https://forms.gle/jv6RkX5s784LgQC89</a:t>
+            </a:r>
+            <a:r>
+              <a:rPr lang="en-US" dirty="0"/>
+              <a:t> </a:t>
+            </a:r>
+          </a:p>
+          <a:p>
+            <a:endParaRPr lang="en-US" dirty="0"/>
+          </a:p>
+          <a:p>
+            <a:r>
+              <a:rPr lang="en-US" b="1" i="1" dirty="0">
+                <a:solidFill>
+                  <a:schemeClr val="accent1"/>
+                </a:solidFill>
+              </a:rPr>
+              <a:t>Note: you will not be contacted by the NeuroDOT development team unless you opt-in to receiving communications.</a:t>
+            </a:r>
+          </a:p>
+        </p:txBody>
+      </p:sp>
+      <p:sp>
+        <p:nvSpPr>
+          <p:cNvPr id="4" name="Slide Number Placeholder 3">
+            <a:extLst>
+              <a:ext uri="{FF2B5EF4-FFF2-40B4-BE49-F238E27FC236}">
+                <a16:creationId xmlns:a16="http://schemas.microsoft.com/office/drawing/2014/main" id="{57A55562-6001-7F2E-323C-203129D6ED5A}"/>
+              </a:ext>
+            </a:extLst>
+          </p:cNvPr>
+          <p:cNvSpPr>
+            <a:spLocks noGrp="1"/>
+          </p:cNvSpPr>
+          <p:nvPr>
+            <p:ph type="sldNum" sz="quarter" idx="12"/>
+          </p:nvPr>
+        </p:nvSpPr>
+        <p:spPr/>
+        <p:txBody>
+          <a:bodyPr/>
+          <a:lstStyle/>
+          <a:p>
+            <a:fld id="{A6EA515B-EB3D-473C-ADE9-FD8348C61D57}" type="slidenum">
+              <a:rPr lang="en-US" smtClean="0"/>
+              <a:t>15</a:t>
+            </a:fld>
+            <a:endParaRPr lang="en-US"/>
+          </a:p>
+        </p:txBody>
+      </p:sp>
+    </p:spTree>
+    <p:extLst>
+      <p:ext uri="{BB962C8B-B14F-4D97-AF65-F5344CB8AC3E}">
+        <p14:creationId xmlns:p14="http://schemas.microsoft.com/office/powerpoint/2010/main" val="1735739344"/>
+      </p:ext>
+    </p:extLst>
+  </p:cSld>
+  <p:clrMapOvr>
+    <a:masterClrMapping/>
+  </p:clrMapOvr>
+</p:sld>
+</file>
+
+<file path=ppt/slides/slide16.xml><?xml version="1.0" encoding="utf-8"?>
+<p:sld xmlns:a="http://schemas.openxmlformats.org/drawingml/2006/main" xmlns:r="http://schemas.openxmlformats.org/officeDocument/2006/relationships" xmlns:p="http://schemas.openxmlformats.org/presentationml/2006/main">
+  <p:cSld>
+    <p:spTree>
+      <p:nvGrpSpPr>
+        <p:cNvPr id="1" name=""/>
+        <p:cNvGrpSpPr/>
+        <p:nvPr/>
+      </p:nvGrpSpPr>
+      <p:grpSpPr>
+        <a:xfrm>
+          <a:off x="0" y="0"/>
+          <a:ext cx="0" cy="0"/>
+          <a:chOff x="0" y="0"/>
+          <a:chExt cx="0" cy="0"/>
+        </a:xfrm>
+      </p:grpSpPr>
+      <p:sp>
+        <p:nvSpPr>
+          <p:cNvPr id="2" name="Title 1">
+            <a:extLst>
+              <a:ext uri="{FF2B5EF4-FFF2-40B4-BE49-F238E27FC236}">
                 <a16:creationId xmlns:a16="http://schemas.microsoft.com/office/drawing/2014/main" id="{6EF9240B-3C26-422B-919D-F6DAEE44984A}"/>
               </a:ext>
             </a:extLst>

</xml_diff>